<commit_message>
debug and workout updates
</commit_message>
<xml_diff>
--- a/work/workout.pptx
+++ b/work/workout.pptx
@@ -104,6 +104,11 @@
       </a:defRPr>
     </a:lvl9pPr>
   </p:defaultTextStyle>
+  <p:extLst>
+    <p:ext uri="{EFAFB233-063F-42B5-8137-9DF3F51BA10A}">
+      <p15:sldGuideLst xmlns:p15="http://schemas.microsoft.com/office/powerpoint/2012/main"/>
+    </p:ext>
+  </p:extLst>
 </p:presentation>
 </file>
 
@@ -254,7 +259,7 @@
           <a:p>
             <a:fld id="{A6358DFD-5C45-4AA6-815F-91A6EB7D1922}" type="datetimeFigureOut">
               <a:rPr lang="en-US" smtClean="0"/>
-              <a:t>4/10/2023</a:t>
+              <a:t>4/12/2023</a:t>
             </a:fld>
             <a:endParaRPr lang="en-US"/>
           </a:p>
@@ -452,7 +457,7 @@
           <a:p>
             <a:fld id="{A6358DFD-5C45-4AA6-815F-91A6EB7D1922}" type="datetimeFigureOut">
               <a:rPr lang="en-US" smtClean="0"/>
-              <a:t>4/10/2023</a:t>
+              <a:t>4/12/2023</a:t>
             </a:fld>
             <a:endParaRPr lang="en-US"/>
           </a:p>
@@ -660,7 +665,7 @@
           <a:p>
             <a:fld id="{A6358DFD-5C45-4AA6-815F-91A6EB7D1922}" type="datetimeFigureOut">
               <a:rPr lang="en-US" smtClean="0"/>
-              <a:t>4/10/2023</a:t>
+              <a:t>4/12/2023</a:t>
             </a:fld>
             <a:endParaRPr lang="en-US"/>
           </a:p>
@@ -858,7 +863,7 @@
           <a:p>
             <a:fld id="{A6358DFD-5C45-4AA6-815F-91A6EB7D1922}" type="datetimeFigureOut">
               <a:rPr lang="en-US" smtClean="0"/>
-              <a:t>4/10/2023</a:t>
+              <a:t>4/12/2023</a:t>
             </a:fld>
             <a:endParaRPr lang="en-US"/>
           </a:p>
@@ -1133,7 +1138,7 @@
           <a:p>
             <a:fld id="{A6358DFD-5C45-4AA6-815F-91A6EB7D1922}" type="datetimeFigureOut">
               <a:rPr lang="en-US" smtClean="0"/>
-              <a:t>4/10/2023</a:t>
+              <a:t>4/12/2023</a:t>
             </a:fld>
             <a:endParaRPr lang="en-US"/>
           </a:p>
@@ -1398,7 +1403,7 @@
           <a:p>
             <a:fld id="{A6358DFD-5C45-4AA6-815F-91A6EB7D1922}" type="datetimeFigureOut">
               <a:rPr lang="en-US" smtClean="0"/>
-              <a:t>4/10/2023</a:t>
+              <a:t>4/12/2023</a:t>
             </a:fld>
             <a:endParaRPr lang="en-US"/>
           </a:p>
@@ -1810,7 +1815,7 @@
           <a:p>
             <a:fld id="{A6358DFD-5C45-4AA6-815F-91A6EB7D1922}" type="datetimeFigureOut">
               <a:rPr lang="en-US" smtClean="0"/>
-              <a:t>4/10/2023</a:t>
+              <a:t>4/12/2023</a:t>
             </a:fld>
             <a:endParaRPr lang="en-US"/>
           </a:p>
@@ -1951,7 +1956,7 @@
           <a:p>
             <a:fld id="{A6358DFD-5C45-4AA6-815F-91A6EB7D1922}" type="datetimeFigureOut">
               <a:rPr lang="en-US" smtClean="0"/>
-              <a:t>4/10/2023</a:t>
+              <a:t>4/12/2023</a:t>
             </a:fld>
             <a:endParaRPr lang="en-US"/>
           </a:p>
@@ -2064,7 +2069,7 @@
           <a:p>
             <a:fld id="{A6358DFD-5C45-4AA6-815F-91A6EB7D1922}" type="datetimeFigureOut">
               <a:rPr lang="en-US" smtClean="0"/>
-              <a:t>4/10/2023</a:t>
+              <a:t>4/12/2023</a:t>
             </a:fld>
             <a:endParaRPr lang="en-US"/>
           </a:p>
@@ -2375,7 +2380,7 @@
           <a:p>
             <a:fld id="{A6358DFD-5C45-4AA6-815F-91A6EB7D1922}" type="datetimeFigureOut">
               <a:rPr lang="en-US" smtClean="0"/>
-              <a:t>4/10/2023</a:t>
+              <a:t>4/12/2023</a:t>
             </a:fld>
             <a:endParaRPr lang="en-US"/>
           </a:p>
@@ -2663,7 +2668,7 @@
           <a:p>
             <a:fld id="{A6358DFD-5C45-4AA6-815F-91A6EB7D1922}" type="datetimeFigureOut">
               <a:rPr lang="en-US" smtClean="0"/>
-              <a:t>4/10/2023</a:t>
+              <a:t>4/12/2023</a:t>
             </a:fld>
             <a:endParaRPr lang="en-US"/>
           </a:p>
@@ -2904,7 +2909,7 @@
           <a:p>
             <a:fld id="{A6358DFD-5C45-4AA6-815F-91A6EB7D1922}" type="datetimeFigureOut">
               <a:rPr lang="en-US" smtClean="0"/>
-              <a:t>4/10/2023</a:t>
+              <a:t>4/12/2023</a:t>
             </a:fld>
             <a:endParaRPr lang="en-US"/>
           </a:p>
@@ -3411,7 +3416,7 @@
           <a:lstStyle/>
           <a:p>
             <a:pPr algn="ctr"/>
-            <a:endParaRPr lang="en-US"/>
+            <a:endParaRPr lang="en-US" dirty="0"/>
           </a:p>
         </p:txBody>
       </p:sp>
@@ -4141,6 +4146,334 @@
             <a:r>
               <a:rPr lang="en-US" sz="1100" dirty="0"/>
               <a:t>Shoulder Press</a:t>
+            </a:r>
+          </a:p>
+        </p:txBody>
+      </p:sp>
+      <p:sp>
+        <p:nvSpPr>
+          <p:cNvPr id="2" name="Rectangle 1">
+            <a:extLst>
+              <a:ext uri="{FF2B5EF4-FFF2-40B4-BE49-F238E27FC236}">
+                <a16:creationId xmlns:a16="http://schemas.microsoft.com/office/drawing/2014/main" id="{CF875956-D13F-3925-05C7-B5EF05C85952}"/>
+              </a:ext>
+            </a:extLst>
+          </p:cNvPr>
+          <p:cNvSpPr/>
+          <p:nvPr/>
+        </p:nvSpPr>
+        <p:spPr>
+          <a:xfrm>
+            <a:off x="533394" y="3301998"/>
+            <a:ext cx="372533" cy="448741"/>
+          </a:xfrm>
+          <a:prstGeom prst="rect">
+            <a:avLst/>
+          </a:prstGeom>
+          <a:noFill/>
+        </p:spPr>
+        <p:style>
+          <a:lnRef idx="2">
+            <a:schemeClr val="accent1">
+              <a:shade val="50000"/>
+            </a:schemeClr>
+          </a:lnRef>
+          <a:fillRef idx="1">
+            <a:schemeClr val="accent1"/>
+          </a:fillRef>
+          <a:effectRef idx="0">
+            <a:schemeClr val="accent1"/>
+          </a:effectRef>
+          <a:fontRef idx="minor">
+            <a:schemeClr val="lt1"/>
+          </a:fontRef>
+        </p:style>
+        <p:txBody>
+          <a:bodyPr rtlCol="0" anchor="ctr"/>
+          <a:lstStyle/>
+          <a:p>
+            <a:pPr algn="ctr"/>
+            <a:endParaRPr lang="en-US"/>
+          </a:p>
+        </p:txBody>
+      </p:sp>
+      <p:sp>
+        <p:nvSpPr>
+          <p:cNvPr id="3" name="Rectangle 2">
+            <a:extLst>
+              <a:ext uri="{FF2B5EF4-FFF2-40B4-BE49-F238E27FC236}">
+                <a16:creationId xmlns:a16="http://schemas.microsoft.com/office/drawing/2014/main" id="{EE7CA48B-DD6B-20B9-2D21-BA57EAF27D42}"/>
+              </a:ext>
+            </a:extLst>
+          </p:cNvPr>
+          <p:cNvSpPr/>
+          <p:nvPr/>
+        </p:nvSpPr>
+        <p:spPr>
+          <a:xfrm>
+            <a:off x="533393" y="5681134"/>
+            <a:ext cx="372533" cy="448741"/>
+          </a:xfrm>
+          <a:prstGeom prst="rect">
+            <a:avLst/>
+          </a:prstGeom>
+          <a:noFill/>
+        </p:spPr>
+        <p:style>
+          <a:lnRef idx="2">
+            <a:schemeClr val="accent1">
+              <a:shade val="50000"/>
+            </a:schemeClr>
+          </a:lnRef>
+          <a:fillRef idx="1">
+            <a:schemeClr val="accent1"/>
+          </a:fillRef>
+          <a:effectRef idx="0">
+            <a:schemeClr val="accent1"/>
+          </a:effectRef>
+          <a:fontRef idx="minor">
+            <a:schemeClr val="lt1"/>
+          </a:fontRef>
+        </p:style>
+        <p:txBody>
+          <a:bodyPr rtlCol="0" anchor="ctr"/>
+          <a:lstStyle/>
+          <a:p>
+            <a:pPr algn="ctr"/>
+            <a:endParaRPr lang="en-US"/>
+          </a:p>
+        </p:txBody>
+      </p:sp>
+      <p:sp>
+        <p:nvSpPr>
+          <p:cNvPr id="10" name="Rectangle 9">
+            <a:extLst>
+              <a:ext uri="{FF2B5EF4-FFF2-40B4-BE49-F238E27FC236}">
+                <a16:creationId xmlns:a16="http://schemas.microsoft.com/office/drawing/2014/main" id="{2BF6DF3E-856A-588D-82E4-A11D58BF3D49}"/>
+              </a:ext>
+            </a:extLst>
+          </p:cNvPr>
+          <p:cNvSpPr/>
+          <p:nvPr/>
+        </p:nvSpPr>
+        <p:spPr>
+          <a:xfrm>
+            <a:off x="533394" y="4868335"/>
+            <a:ext cx="372533" cy="448741"/>
+          </a:xfrm>
+          <a:prstGeom prst="rect">
+            <a:avLst/>
+          </a:prstGeom>
+          <a:noFill/>
+        </p:spPr>
+        <p:style>
+          <a:lnRef idx="2">
+            <a:schemeClr val="accent1">
+              <a:shade val="50000"/>
+            </a:schemeClr>
+          </a:lnRef>
+          <a:fillRef idx="1">
+            <a:schemeClr val="accent1"/>
+          </a:fillRef>
+          <a:effectRef idx="0">
+            <a:schemeClr val="accent1"/>
+          </a:effectRef>
+          <a:fontRef idx="minor">
+            <a:schemeClr val="lt1"/>
+          </a:fontRef>
+        </p:style>
+        <p:txBody>
+          <a:bodyPr rtlCol="0" anchor="ctr"/>
+          <a:lstStyle/>
+          <a:p>
+            <a:pPr algn="ctr"/>
+            <a:endParaRPr lang="en-US"/>
+          </a:p>
+        </p:txBody>
+      </p:sp>
+      <p:sp>
+        <p:nvSpPr>
+          <p:cNvPr id="24" name="TextBox 23">
+            <a:extLst>
+              <a:ext uri="{FF2B5EF4-FFF2-40B4-BE49-F238E27FC236}">
+                <a16:creationId xmlns:a16="http://schemas.microsoft.com/office/drawing/2014/main" id="{E93186BB-6012-6ABF-77B0-32BC536DD72A}"/>
+              </a:ext>
+            </a:extLst>
+          </p:cNvPr>
+          <p:cNvSpPr txBox="1"/>
+          <p:nvPr/>
+        </p:nvSpPr>
+        <p:spPr>
+          <a:xfrm rot="16200000">
+            <a:off x="38412" y="3395567"/>
+            <a:ext cx="736585" cy="261610"/>
+          </a:xfrm>
+          <a:prstGeom prst="rect">
+            <a:avLst/>
+          </a:prstGeom>
+          <a:noFill/>
+        </p:spPr>
+        <p:txBody>
+          <a:bodyPr wrap="square" rtlCol="0">
+            <a:spAutoFit/>
+          </a:bodyPr>
+          <a:lstStyle/>
+          <a:p>
+            <a:r>
+              <a:rPr lang="en-US" sz="1100" dirty="0"/>
+              <a:t>Back Ext</a:t>
+            </a:r>
+          </a:p>
+        </p:txBody>
+      </p:sp>
+      <p:sp>
+        <p:nvSpPr>
+          <p:cNvPr id="26" name="TextBox 25">
+            <a:extLst>
+              <a:ext uri="{FF2B5EF4-FFF2-40B4-BE49-F238E27FC236}">
+                <a16:creationId xmlns:a16="http://schemas.microsoft.com/office/drawing/2014/main" id="{5ABE6A30-663C-37E4-9CA8-522EBDE52D4E}"/>
+              </a:ext>
+            </a:extLst>
+          </p:cNvPr>
+          <p:cNvSpPr txBox="1"/>
+          <p:nvPr/>
+        </p:nvSpPr>
+        <p:spPr>
+          <a:xfrm rot="16200000">
+            <a:off x="4532" y="5012575"/>
+            <a:ext cx="787400" cy="261610"/>
+          </a:xfrm>
+          <a:prstGeom prst="rect">
+            <a:avLst/>
+          </a:prstGeom>
+          <a:noFill/>
+        </p:spPr>
+        <p:txBody>
+          <a:bodyPr wrap="square" rtlCol="0">
+            <a:spAutoFit/>
+          </a:bodyPr>
+          <a:lstStyle/>
+          <a:p>
+            <a:r>
+              <a:rPr lang="en-US" sz="1100" dirty="0"/>
+              <a:t>Ab Crunch</a:t>
+            </a:r>
+          </a:p>
+        </p:txBody>
+      </p:sp>
+      <p:sp>
+        <p:nvSpPr>
+          <p:cNvPr id="27" name="TextBox 26">
+            <a:extLst>
+              <a:ext uri="{FF2B5EF4-FFF2-40B4-BE49-F238E27FC236}">
+                <a16:creationId xmlns:a16="http://schemas.microsoft.com/office/drawing/2014/main" id="{0C7B6AE6-EC8F-A953-D9C3-0DC278EA4664}"/>
+              </a:ext>
+            </a:extLst>
+          </p:cNvPr>
+          <p:cNvSpPr txBox="1"/>
+          <p:nvPr/>
+        </p:nvSpPr>
+        <p:spPr>
+          <a:xfrm rot="16200000">
+            <a:off x="29945" y="5889115"/>
+            <a:ext cx="736586" cy="261610"/>
+          </a:xfrm>
+          <a:prstGeom prst="rect">
+            <a:avLst/>
+          </a:prstGeom>
+          <a:noFill/>
+        </p:spPr>
+        <p:txBody>
+          <a:bodyPr wrap="square" rtlCol="0">
+            <a:spAutoFit/>
+          </a:bodyPr>
+          <a:lstStyle/>
+          <a:p>
+            <a:r>
+              <a:rPr lang="en-US" sz="1100" dirty="0"/>
+              <a:t>Leg Press</a:t>
+            </a:r>
+          </a:p>
+        </p:txBody>
+      </p:sp>
+      <p:sp>
+        <p:nvSpPr>
+          <p:cNvPr id="28" name="Rectangle 27">
+            <a:extLst>
+              <a:ext uri="{FF2B5EF4-FFF2-40B4-BE49-F238E27FC236}">
+                <a16:creationId xmlns:a16="http://schemas.microsoft.com/office/drawing/2014/main" id="{105CE467-5549-2A5C-AC7C-1FAACB7AE574}"/>
+              </a:ext>
+            </a:extLst>
+          </p:cNvPr>
+          <p:cNvSpPr/>
+          <p:nvPr/>
+        </p:nvSpPr>
+        <p:spPr>
+          <a:xfrm>
+            <a:off x="516459" y="4080932"/>
+            <a:ext cx="372533" cy="448741"/>
+          </a:xfrm>
+          <a:prstGeom prst="rect">
+            <a:avLst/>
+          </a:prstGeom>
+          <a:noFill/>
+        </p:spPr>
+        <p:style>
+          <a:lnRef idx="2">
+            <a:schemeClr val="accent1">
+              <a:shade val="50000"/>
+            </a:schemeClr>
+          </a:lnRef>
+          <a:fillRef idx="1">
+            <a:schemeClr val="accent1"/>
+          </a:fillRef>
+          <a:effectRef idx="0">
+            <a:schemeClr val="accent1"/>
+          </a:effectRef>
+          <a:fontRef idx="minor">
+            <a:schemeClr val="lt1"/>
+          </a:fontRef>
+        </p:style>
+        <p:txBody>
+          <a:bodyPr rtlCol="0" anchor="ctr"/>
+          <a:lstStyle/>
+          <a:p>
+            <a:pPr algn="ctr"/>
+            <a:endParaRPr lang="en-US"/>
+          </a:p>
+        </p:txBody>
+      </p:sp>
+      <p:sp>
+        <p:nvSpPr>
+          <p:cNvPr id="29" name="TextBox 28">
+            <a:extLst>
+              <a:ext uri="{FF2B5EF4-FFF2-40B4-BE49-F238E27FC236}">
+                <a16:creationId xmlns:a16="http://schemas.microsoft.com/office/drawing/2014/main" id="{3685D4AB-002A-4DB2-CB5C-3FE57F3BF803}"/>
+              </a:ext>
+            </a:extLst>
+          </p:cNvPr>
+          <p:cNvSpPr txBox="1"/>
+          <p:nvPr/>
+        </p:nvSpPr>
+        <p:spPr>
+          <a:xfrm rot="16200000">
+            <a:off x="13003" y="4250582"/>
+            <a:ext cx="736587" cy="261610"/>
+          </a:xfrm>
+          <a:prstGeom prst="rect">
+            <a:avLst/>
+          </a:prstGeom>
+          <a:noFill/>
+        </p:spPr>
+        <p:txBody>
+          <a:bodyPr wrap="square" rtlCol="0">
+            <a:spAutoFit/>
+          </a:bodyPr>
+          <a:lstStyle/>
+          <a:p>
+            <a:r>
+              <a:rPr lang="en-US" sz="1100" dirty="0"/>
+              <a:t>Torso Rot</a:t>
             </a:r>
           </a:p>
         </p:txBody>

</xml_diff>